<commit_message>
finally made a real layout
</commit_message>
<xml_diff>
--- a/Layout/PMK01_Layout.pptx
+++ b/Layout/PMK01_Layout.pptx
@@ -265,7 +265,7 @@
           <a:p>
             <a:fld id="{EF74D64E-7CBF-445C-8CD4-1195CDF2BDFB}" type="datetimeFigureOut">
               <a:rPr lang="fr-CH" smtClean="0"/>
-              <a:t>30.07.2024</a:t>
+              <a:t>08.09.2024</a:t>
             </a:fld>
             <a:endParaRPr lang="fr-CH"/>
           </a:p>
@@ -319,7 +319,7 @@
           <a:p>
             <a:fld id="{01E72BC7-7879-4BB3-A95F-115B99B38BBE}" type="slidenum">
               <a:rPr lang="fr-CH" smtClean="0"/>
-              <a:t>‹N°›</a:t>
+              <a:t>‹#›</a:t>
             </a:fld>
             <a:endParaRPr lang="fr-CH"/>
           </a:p>
@@ -465,7 +465,7 @@
           <a:p>
             <a:fld id="{EF74D64E-7CBF-445C-8CD4-1195CDF2BDFB}" type="datetimeFigureOut">
               <a:rPr lang="fr-CH" smtClean="0"/>
-              <a:t>30.07.2024</a:t>
+              <a:t>08.09.2024</a:t>
             </a:fld>
             <a:endParaRPr lang="fr-CH"/>
           </a:p>
@@ -519,7 +519,7 @@
           <a:p>
             <a:fld id="{01E72BC7-7879-4BB3-A95F-115B99B38BBE}" type="slidenum">
               <a:rPr lang="fr-CH" smtClean="0"/>
-              <a:t>‹N°›</a:t>
+              <a:t>‹#›</a:t>
             </a:fld>
             <a:endParaRPr lang="fr-CH"/>
           </a:p>
@@ -675,7 +675,7 @@
           <a:p>
             <a:fld id="{EF74D64E-7CBF-445C-8CD4-1195CDF2BDFB}" type="datetimeFigureOut">
               <a:rPr lang="fr-CH" smtClean="0"/>
-              <a:t>30.07.2024</a:t>
+              <a:t>08.09.2024</a:t>
             </a:fld>
             <a:endParaRPr lang="fr-CH"/>
           </a:p>
@@ -729,7 +729,7 @@
           <a:p>
             <a:fld id="{01E72BC7-7879-4BB3-A95F-115B99B38BBE}" type="slidenum">
               <a:rPr lang="fr-CH" smtClean="0"/>
-              <a:t>‹N°›</a:t>
+              <a:t>‹#›</a:t>
             </a:fld>
             <a:endParaRPr lang="fr-CH"/>
           </a:p>
@@ -875,7 +875,7 @@
           <a:p>
             <a:fld id="{EF74D64E-7CBF-445C-8CD4-1195CDF2BDFB}" type="datetimeFigureOut">
               <a:rPr lang="fr-CH" smtClean="0"/>
-              <a:t>30.07.2024</a:t>
+              <a:t>08.09.2024</a:t>
             </a:fld>
             <a:endParaRPr lang="fr-CH"/>
           </a:p>
@@ -929,7 +929,7 @@
           <a:p>
             <a:fld id="{01E72BC7-7879-4BB3-A95F-115B99B38BBE}" type="slidenum">
               <a:rPr lang="fr-CH" smtClean="0"/>
-              <a:t>‹N°›</a:t>
+              <a:t>‹#›</a:t>
             </a:fld>
             <a:endParaRPr lang="fr-CH"/>
           </a:p>
@@ -1151,7 +1151,7 @@
           <a:p>
             <a:fld id="{EF74D64E-7CBF-445C-8CD4-1195CDF2BDFB}" type="datetimeFigureOut">
               <a:rPr lang="fr-CH" smtClean="0"/>
-              <a:t>30.07.2024</a:t>
+              <a:t>08.09.2024</a:t>
             </a:fld>
             <a:endParaRPr lang="fr-CH"/>
           </a:p>
@@ -1205,7 +1205,7 @@
           <a:p>
             <a:fld id="{01E72BC7-7879-4BB3-A95F-115B99B38BBE}" type="slidenum">
               <a:rPr lang="fr-CH" smtClean="0"/>
-              <a:t>‹N°›</a:t>
+              <a:t>‹#›</a:t>
             </a:fld>
             <a:endParaRPr lang="fr-CH"/>
           </a:p>
@@ -1419,7 +1419,7 @@
           <a:p>
             <a:fld id="{EF74D64E-7CBF-445C-8CD4-1195CDF2BDFB}" type="datetimeFigureOut">
               <a:rPr lang="fr-CH" smtClean="0"/>
-              <a:t>30.07.2024</a:t>
+              <a:t>08.09.2024</a:t>
             </a:fld>
             <a:endParaRPr lang="fr-CH"/>
           </a:p>
@@ -1473,7 +1473,7 @@
           <a:p>
             <a:fld id="{01E72BC7-7879-4BB3-A95F-115B99B38BBE}" type="slidenum">
               <a:rPr lang="fr-CH" smtClean="0"/>
-              <a:t>‹N°›</a:t>
+              <a:t>‹#›</a:t>
             </a:fld>
             <a:endParaRPr lang="fr-CH"/>
           </a:p>
@@ -1834,7 +1834,7 @@
           <a:p>
             <a:fld id="{EF74D64E-7CBF-445C-8CD4-1195CDF2BDFB}" type="datetimeFigureOut">
               <a:rPr lang="fr-CH" smtClean="0"/>
-              <a:t>30.07.2024</a:t>
+              <a:t>08.09.2024</a:t>
             </a:fld>
             <a:endParaRPr lang="fr-CH"/>
           </a:p>
@@ -1888,7 +1888,7 @@
           <a:p>
             <a:fld id="{01E72BC7-7879-4BB3-A95F-115B99B38BBE}" type="slidenum">
               <a:rPr lang="fr-CH" smtClean="0"/>
-              <a:t>‹N°›</a:t>
+              <a:t>‹#›</a:t>
             </a:fld>
             <a:endParaRPr lang="fr-CH"/>
           </a:p>
@@ -1976,7 +1976,7 @@
           <a:p>
             <a:fld id="{EF74D64E-7CBF-445C-8CD4-1195CDF2BDFB}" type="datetimeFigureOut">
               <a:rPr lang="fr-CH" smtClean="0"/>
-              <a:t>30.07.2024</a:t>
+              <a:t>08.09.2024</a:t>
             </a:fld>
             <a:endParaRPr lang="fr-CH"/>
           </a:p>
@@ -2030,7 +2030,7 @@
           <a:p>
             <a:fld id="{01E72BC7-7879-4BB3-A95F-115B99B38BBE}" type="slidenum">
               <a:rPr lang="fr-CH" smtClean="0"/>
-              <a:t>‹N°›</a:t>
+              <a:t>‹#›</a:t>
             </a:fld>
             <a:endParaRPr lang="fr-CH"/>
           </a:p>
@@ -2089,7 +2089,7 @@
           <a:p>
             <a:fld id="{EF74D64E-7CBF-445C-8CD4-1195CDF2BDFB}" type="datetimeFigureOut">
               <a:rPr lang="fr-CH" smtClean="0"/>
-              <a:t>30.07.2024</a:t>
+              <a:t>08.09.2024</a:t>
             </a:fld>
             <a:endParaRPr lang="fr-CH"/>
           </a:p>
@@ -2143,7 +2143,7 @@
           <a:p>
             <a:fld id="{01E72BC7-7879-4BB3-A95F-115B99B38BBE}" type="slidenum">
               <a:rPr lang="fr-CH" smtClean="0"/>
-              <a:t>‹N°›</a:t>
+              <a:t>‹#›</a:t>
             </a:fld>
             <a:endParaRPr lang="fr-CH"/>
           </a:p>
@@ -2402,7 +2402,7 @@
           <a:p>
             <a:fld id="{EF74D64E-7CBF-445C-8CD4-1195CDF2BDFB}" type="datetimeFigureOut">
               <a:rPr lang="fr-CH" smtClean="0"/>
-              <a:t>30.07.2024</a:t>
+              <a:t>08.09.2024</a:t>
             </a:fld>
             <a:endParaRPr lang="fr-CH"/>
           </a:p>
@@ -2456,7 +2456,7 @@
           <a:p>
             <a:fld id="{01E72BC7-7879-4BB3-A95F-115B99B38BBE}" type="slidenum">
               <a:rPr lang="fr-CH" smtClean="0"/>
-              <a:t>‹N°›</a:t>
+              <a:t>‹#›</a:t>
             </a:fld>
             <a:endParaRPr lang="fr-CH"/>
           </a:p>
@@ -2691,7 +2691,7 @@
           <a:p>
             <a:fld id="{EF74D64E-7CBF-445C-8CD4-1195CDF2BDFB}" type="datetimeFigureOut">
               <a:rPr lang="fr-CH" smtClean="0"/>
-              <a:t>30.07.2024</a:t>
+              <a:t>08.09.2024</a:t>
             </a:fld>
             <a:endParaRPr lang="fr-CH"/>
           </a:p>
@@ -2745,7 +2745,7 @@
           <a:p>
             <a:fld id="{01E72BC7-7879-4BB3-A95F-115B99B38BBE}" type="slidenum">
               <a:rPr lang="fr-CH" smtClean="0"/>
-              <a:t>‹N°›</a:t>
+              <a:t>‹#›</a:t>
             </a:fld>
             <a:endParaRPr lang="fr-CH"/>
           </a:p>
@@ -2934,7 +2934,7 @@
           <a:p>
             <a:fld id="{EF74D64E-7CBF-445C-8CD4-1195CDF2BDFB}" type="datetimeFigureOut">
               <a:rPr lang="fr-CH" smtClean="0"/>
-              <a:t>30.07.2024</a:t>
+              <a:t>08.09.2024</a:t>
             </a:fld>
             <a:endParaRPr lang="fr-CH"/>
           </a:p>
@@ -3024,7 +3024,7 @@
           <a:p>
             <a:fld id="{01E72BC7-7879-4BB3-A95F-115B99B38BBE}" type="slidenum">
               <a:rPr lang="fr-CH" smtClean="0"/>
-              <a:t>‹N°›</a:t>
+              <a:t>‹#›</a:t>
             </a:fld>
             <a:endParaRPr lang="fr-CH"/>
           </a:p>
@@ -12959,7 +12959,7 @@
           <a:p>
             <a:r>
               <a:rPr lang="fr-CH" dirty="0"/>
-              <a:t>Esc</a:t>
+              <a:t>§°</a:t>
             </a:r>
           </a:p>
         </p:txBody>
@@ -13203,9 +13203,10 @@
           <a:lstStyle/>
           <a:p>
             <a:r>
-              <a:rPr lang="fr-CH" dirty="0"/>
-              <a:t>y</a:t>
-            </a:r>
+              <a:rPr lang="en-US" dirty="0"/>
+              <a:t>&lt;</a:t>
+            </a:r>
+            <a:endParaRPr lang="fr-CH" dirty="0"/>
           </a:p>
         </p:txBody>
       </p:sp>
@@ -14253,8 +14254,12 @@
           <a:lstStyle/>
           <a:p>
             <a:r>
+              <a:rPr lang="en-US" dirty="0"/>
+              <a:t>‘</a:t>
+            </a:r>
+            <a:r>
               <a:rPr lang="fr-CH" dirty="0"/>
-              <a:t>9</a:t>
+              <a:t>?</a:t>
             </a:r>
           </a:p>
         </p:txBody>
@@ -14498,8 +14503,12 @@
           <a:lstStyle/>
           <a:p>
             <a:r>
+              <a:rPr lang="en-US" dirty="0"/>
+              <a:t>^</a:t>
+            </a:r>
+            <a:r>
               <a:rPr lang="fr-CH" dirty="0"/>
-              <a:t>0</a:t>
+              <a:t>`~</a:t>
             </a:r>
           </a:p>
         </p:txBody>
@@ -14533,8 +14542,12 @@
           <a:lstStyle/>
           <a:p>
             <a:r>
+              <a:rPr lang="en-US" dirty="0"/>
+              <a:t>è</a:t>
+            </a:r>
+            <a:r>
               <a:rPr lang="fr-CH" dirty="0"/>
-              <a:t>p</a:t>
+              <a:t>[</a:t>
             </a:r>
           </a:p>
         </p:txBody>
@@ -14568,8 +14581,12 @@
           <a:lstStyle/>
           <a:p>
             <a:r>
+              <a:rPr lang="en-US" dirty="0"/>
+              <a:t>à</a:t>
+            </a:r>
+            <a:r>
               <a:rPr lang="fr-CH" dirty="0"/>
-              <a:t>é</a:t>
+              <a:t>{</a:t>
             </a:r>
           </a:p>
         </p:txBody>
@@ -14674,7 +14691,7 @@
           <a:p>
             <a:r>
               <a:rPr lang="fr-CH" dirty="0"/>
-              <a:t>Suppr</a:t>
+              <a:t>¨]!</a:t>
             </a:r>
           </a:p>
         </p:txBody>
@@ -14708,8 +14725,12 @@
           <a:lstStyle/>
           <a:p>
             <a:r>
+              <a:rPr lang="en-US" dirty="0"/>
+              <a:t>$</a:t>
+            </a:r>
+            <a:r>
               <a:rPr lang="fr-CH" dirty="0"/>
-              <a:t>à</a:t>
+              <a:t>}</a:t>
             </a:r>
           </a:p>
         </p:txBody>

</xml_diff>